<commit_message>
final updates for Fall 2019
</commit_message>
<xml_diff>
--- a/L08-convex_hulls.pptx
+++ b/L08-convex_hulls.pptx
@@ -257,7 +257,7 @@
           <a:p>
             <a:fld id="{C787A165-4FDD-49E5-9F6D-D505BB88ABC6}" type="datetimeFigureOut">
               <a:rPr lang="en-US" smtClean="0"/>
-              <a:t>7/25/19</a:t>
+              <a:t>10/31/19</a:t>
             </a:fld>
             <a:endParaRPr lang="en-US"/>
           </a:p>
@@ -423,7 +423,7 @@
           <a:p>
             <a:fld id="{5D612DD9-5214-4F09-A917-0755DC49A4D5}" type="datetimeFigureOut">
               <a:rPr lang="en-US" smtClean="0"/>
-              <a:t>7/25/19</a:t>
+              <a:t>10/31/19</a:t>
             </a:fld>
             <a:endParaRPr lang="en-US"/>
           </a:p>
@@ -1672,7 +1672,7 @@
           </a:ln>
           <a:extLst>
             <a:ext uri="{909E8E84-426E-40dd-AFC4-6F175D3DCCD1}">
-              <a14:hiddenFill xmlns:a14="http://schemas.microsoft.com/office/drawing/2010/main" xmlns="">
+              <a14:hiddenFill xmlns="" xmlns:a14="http://schemas.microsoft.com/office/drawing/2010/main">
                 <a:solidFill>
                   <a:srgbClr val="FFFFFF"/>
                 </a:solidFill>
@@ -1718,7 +1718,7 @@
           </a:ln>
           <a:extLst>
             <a:ext uri="{909E8E84-426E-40dd-AFC4-6F175D3DCCD1}">
-              <a14:hiddenFill xmlns:a14="http://schemas.microsoft.com/office/drawing/2010/main" xmlns="">
+              <a14:hiddenFill xmlns="" xmlns:a14="http://schemas.microsoft.com/office/drawing/2010/main">
                 <a:solidFill>
                   <a:srgbClr val="FFFFFF"/>
                 </a:solidFill>
@@ -1764,7 +1764,7 @@
           </a:ln>
           <a:extLst>
             <a:ext uri="{909E8E84-426E-40dd-AFC4-6F175D3DCCD1}">
-              <a14:hiddenFill xmlns:a14="http://schemas.microsoft.com/office/drawing/2010/main" xmlns="">
+              <a14:hiddenFill xmlns="" xmlns:a14="http://schemas.microsoft.com/office/drawing/2010/main">
                 <a:solidFill>
                   <a:srgbClr val="FFFFFF"/>
                 </a:solidFill>
@@ -1808,7 +1808,7 @@
           </a:ln>
           <a:extLst>
             <a:ext uri="{909E8E84-426E-40dd-AFC4-6F175D3DCCD1}">
-              <a14:hiddenFill xmlns:a14="http://schemas.microsoft.com/office/drawing/2010/main" xmlns="">
+              <a14:hiddenFill xmlns="" xmlns:a14="http://schemas.microsoft.com/office/drawing/2010/main">
                 <a:solidFill>
                   <a:srgbClr val="FFFFFF"/>
                 </a:solidFill>
@@ -1854,7 +1854,7 @@
           </a:ln>
           <a:extLst>
             <a:ext uri="{909E8E84-426E-40dd-AFC4-6F175D3DCCD1}">
-              <a14:hiddenFill xmlns:a14="http://schemas.microsoft.com/office/drawing/2010/main" xmlns="">
+              <a14:hiddenFill xmlns="" xmlns:a14="http://schemas.microsoft.com/office/drawing/2010/main">
                 <a:solidFill>
                   <a:srgbClr val="FFFFFF"/>
                 </a:solidFill>
@@ -1900,7 +1900,7 @@
           </a:ln>
           <a:extLst>
             <a:ext uri="{909E8E84-426E-40dd-AFC4-6F175D3DCCD1}">
-              <a14:hiddenFill xmlns:a14="http://schemas.microsoft.com/office/drawing/2010/main" xmlns="">
+              <a14:hiddenFill xmlns="" xmlns:a14="http://schemas.microsoft.com/office/drawing/2010/main">
                 <a:solidFill>
                   <a:srgbClr val="FFFFFF"/>
                 </a:solidFill>
@@ -5541,7 +5541,7 @@
           </a:ln>
           <a:extLst>
             <a:ext uri="{909E8E84-426E-40dd-AFC4-6F175D3DCCD1}">
-              <a14:hiddenFill xmlns:a14="http://schemas.microsoft.com/office/drawing/2010/main" xmlns="">
+              <a14:hiddenFill xmlns="" xmlns:a14="http://schemas.microsoft.com/office/drawing/2010/main">
                 <a:solidFill>
                   <a:srgbClr val="FFFFFF"/>
                 </a:solidFill>
@@ -5587,7 +5587,7 @@
           </a:ln>
           <a:extLst>
             <a:ext uri="{909E8E84-426E-40dd-AFC4-6F175D3DCCD1}">
-              <a14:hiddenFill xmlns:a14="http://schemas.microsoft.com/office/drawing/2010/main" xmlns="">
+              <a14:hiddenFill xmlns="" xmlns:a14="http://schemas.microsoft.com/office/drawing/2010/main">
                 <a:solidFill>
                   <a:srgbClr val="FFFFFF"/>
                 </a:solidFill>
@@ -5633,7 +5633,7 @@
           </a:ln>
           <a:extLst>
             <a:ext uri="{909E8E84-426E-40dd-AFC4-6F175D3DCCD1}">
-              <a14:hiddenFill xmlns:a14="http://schemas.microsoft.com/office/drawing/2010/main" xmlns="">
+              <a14:hiddenFill xmlns="" xmlns:a14="http://schemas.microsoft.com/office/drawing/2010/main">
                 <a:solidFill>
                   <a:srgbClr val="FFFFFF"/>
                 </a:solidFill>
@@ -5677,7 +5677,7 @@
           </a:ln>
           <a:extLst>
             <a:ext uri="{909E8E84-426E-40dd-AFC4-6F175D3DCCD1}">
-              <a14:hiddenFill xmlns:a14="http://schemas.microsoft.com/office/drawing/2010/main" xmlns="">
+              <a14:hiddenFill xmlns="" xmlns:a14="http://schemas.microsoft.com/office/drawing/2010/main">
                 <a:solidFill>
                   <a:srgbClr val="FFFFFF"/>
                 </a:solidFill>
@@ -5723,7 +5723,7 @@
           </a:ln>
           <a:extLst>
             <a:ext uri="{909E8E84-426E-40dd-AFC4-6F175D3DCCD1}">
-              <a14:hiddenFill xmlns:a14="http://schemas.microsoft.com/office/drawing/2010/main" xmlns="">
+              <a14:hiddenFill xmlns="" xmlns:a14="http://schemas.microsoft.com/office/drawing/2010/main">
                 <a:solidFill>
                   <a:srgbClr val="FFFFFF"/>
                 </a:solidFill>
@@ -5769,7 +5769,7 @@
           </a:ln>
           <a:extLst>
             <a:ext uri="{909E8E84-426E-40dd-AFC4-6F175D3DCCD1}">
-              <a14:hiddenFill xmlns:a14="http://schemas.microsoft.com/office/drawing/2010/main" xmlns="">
+              <a14:hiddenFill xmlns="" xmlns:a14="http://schemas.microsoft.com/office/drawing/2010/main">
                 <a:solidFill>
                   <a:srgbClr val="FFFFFF"/>
                 </a:solidFill>
@@ -7961,7 +7961,7 @@
           <a:p>
             <a:fld id="{6E39BF48-6E0A-4E37-BB05-8DF70571673D}" type="datetimeFigureOut">
               <a:rPr lang="en-US" smtClean="0"/>
-              <a:t>7/25/19</a:t>
+              <a:t>10/31/19</a:t>
             </a:fld>
             <a:endParaRPr lang="en-US"/>
           </a:p>
@@ -24552,328 +24552,349 @@
           </a:p>
         </p:txBody>
       </p:sp>
-      <p:sp>
-        <p:nvSpPr>
-          <p:cNvPr id="15" name="Oval 14">
+      <p:grpSp>
+        <p:nvGrpSpPr>
+          <p:cNvPr id="2" name="Group 1">
             <a:extLst>
               <a:ext uri="{FF2B5EF4-FFF2-40B4-BE49-F238E27FC236}">
-                <a16:creationId xmlns:a16="http://schemas.microsoft.com/office/drawing/2014/main" id="{61117E86-0025-E243-96AE-1646E99DA366}"/>
+                <a16:creationId xmlns:a16="http://schemas.microsoft.com/office/drawing/2014/main" id="{8B383530-5461-5845-B47E-66FD10431DAC}"/>
               </a:ext>
             </a:extLst>
           </p:cNvPr>
-          <p:cNvSpPr/>
+          <p:cNvGrpSpPr/>
           <p:nvPr/>
-        </p:nvSpPr>
-        <p:spPr>
+        </p:nvGrpSpPr>
+        <p:grpSpPr>
           <a:xfrm>
-            <a:off x="7086600" y="3150951"/>
-            <a:ext cx="137160" cy="137160"/>
+            <a:off x="3200400" y="1753701"/>
+            <a:ext cx="5334000" cy="3453830"/>
+            <a:chOff x="3886200" y="2565970"/>
+            <a:chExt cx="3657600" cy="2483406"/>
           </a:xfrm>
-          <a:prstGeom prst="ellipse">
-            <a:avLst/>
-          </a:prstGeom>
-        </p:spPr>
-        <p:style>
-          <a:lnRef idx="2">
-            <a:schemeClr val="accent1">
-              <a:shade val="50000"/>
-            </a:schemeClr>
-          </a:lnRef>
-          <a:fillRef idx="1">
-            <a:schemeClr val="accent1"/>
-          </a:fillRef>
-          <a:effectRef idx="0">
-            <a:schemeClr val="accent1"/>
-          </a:effectRef>
-          <a:fontRef idx="minor">
-            <a:schemeClr val="lt1"/>
-          </a:fontRef>
-        </p:style>
-        <p:txBody>
-          <a:bodyPr rtlCol="0" anchor="ctr"/>
-          <a:lstStyle/>
-          <a:p>
-            <a:pPr algn="ctr"/>
-            <a:endParaRPr lang="en-US"/>
-          </a:p>
-        </p:txBody>
-      </p:sp>
-      <p:sp>
-        <p:nvSpPr>
-          <p:cNvPr id="23" name="Oval 22">
-            <a:extLst>
-              <a:ext uri="{FF2B5EF4-FFF2-40B4-BE49-F238E27FC236}">
-                <a16:creationId xmlns:a16="http://schemas.microsoft.com/office/drawing/2014/main" id="{A0486EC9-4E24-A948-9917-7B8646A90893}"/>
-              </a:ext>
-            </a:extLst>
-          </p:cNvPr>
-          <p:cNvSpPr/>
-          <p:nvPr/>
-        </p:nvSpPr>
-        <p:spPr>
-          <a:xfrm>
-            <a:off x="6187440" y="3140422"/>
-            <a:ext cx="137160" cy="137160"/>
-          </a:xfrm>
-          <a:prstGeom prst="ellipse">
-            <a:avLst/>
-          </a:prstGeom>
-        </p:spPr>
-        <p:style>
-          <a:lnRef idx="2">
-            <a:schemeClr val="accent1">
-              <a:shade val="50000"/>
-            </a:schemeClr>
-          </a:lnRef>
-          <a:fillRef idx="1">
-            <a:schemeClr val="accent1"/>
-          </a:fillRef>
-          <a:effectRef idx="0">
-            <a:schemeClr val="accent1"/>
-          </a:effectRef>
-          <a:fontRef idx="minor">
-            <a:schemeClr val="lt1"/>
-          </a:fontRef>
-        </p:style>
-        <p:txBody>
-          <a:bodyPr rtlCol="0" anchor="ctr"/>
-          <a:lstStyle/>
-          <a:p>
-            <a:pPr algn="ctr"/>
-            <a:endParaRPr lang="en-US"/>
-          </a:p>
-        </p:txBody>
-      </p:sp>
-      <p:sp>
-        <p:nvSpPr>
-          <p:cNvPr id="24" name="Oval 23">
-            <a:extLst>
-              <a:ext uri="{FF2B5EF4-FFF2-40B4-BE49-F238E27FC236}">
-                <a16:creationId xmlns:a16="http://schemas.microsoft.com/office/drawing/2014/main" id="{78A990E1-11DB-924D-A709-2E93371B107B}"/>
-              </a:ext>
-            </a:extLst>
-          </p:cNvPr>
-          <p:cNvSpPr/>
-          <p:nvPr/>
-        </p:nvSpPr>
-        <p:spPr>
-          <a:xfrm>
-            <a:off x="4722280" y="2565970"/>
-            <a:ext cx="137160" cy="137160"/>
-          </a:xfrm>
-          <a:prstGeom prst="ellipse">
-            <a:avLst/>
-          </a:prstGeom>
-        </p:spPr>
-        <p:style>
-          <a:lnRef idx="2">
-            <a:schemeClr val="accent1">
-              <a:shade val="50000"/>
-            </a:schemeClr>
-          </a:lnRef>
-          <a:fillRef idx="1">
-            <a:schemeClr val="accent1"/>
-          </a:fillRef>
-          <a:effectRef idx="0">
-            <a:schemeClr val="accent1"/>
-          </a:effectRef>
-          <a:fontRef idx="minor">
-            <a:schemeClr val="lt1"/>
-          </a:fontRef>
-        </p:style>
-        <p:txBody>
-          <a:bodyPr rtlCol="0" anchor="ctr"/>
-          <a:lstStyle/>
-          <a:p>
-            <a:pPr algn="ctr"/>
-            <a:endParaRPr lang="en-US"/>
-          </a:p>
-        </p:txBody>
-      </p:sp>
-      <p:sp>
-        <p:nvSpPr>
-          <p:cNvPr id="25" name="Oval 24">
-            <a:extLst>
-              <a:ext uri="{FF2B5EF4-FFF2-40B4-BE49-F238E27FC236}">
-                <a16:creationId xmlns:a16="http://schemas.microsoft.com/office/drawing/2014/main" id="{401AC27D-A72F-0143-9280-FF6592DE5640}"/>
-              </a:ext>
-            </a:extLst>
-          </p:cNvPr>
-          <p:cNvSpPr/>
-          <p:nvPr/>
-        </p:nvSpPr>
-        <p:spPr>
-          <a:xfrm>
-            <a:off x="5229028" y="4003301"/>
-            <a:ext cx="137160" cy="137160"/>
-          </a:xfrm>
-          <a:prstGeom prst="ellipse">
-            <a:avLst/>
-          </a:prstGeom>
-        </p:spPr>
-        <p:style>
-          <a:lnRef idx="2">
-            <a:schemeClr val="accent1">
-              <a:shade val="50000"/>
-            </a:schemeClr>
-          </a:lnRef>
-          <a:fillRef idx="1">
-            <a:schemeClr val="accent1"/>
-          </a:fillRef>
-          <a:effectRef idx="0">
-            <a:schemeClr val="accent1"/>
-          </a:effectRef>
-          <a:fontRef idx="minor">
-            <a:schemeClr val="lt1"/>
-          </a:fontRef>
-        </p:style>
-        <p:txBody>
-          <a:bodyPr rtlCol="0" anchor="ctr"/>
-          <a:lstStyle/>
-          <a:p>
-            <a:pPr algn="ctr"/>
-            <a:endParaRPr lang="en-US"/>
-          </a:p>
-        </p:txBody>
-      </p:sp>
-      <p:sp>
-        <p:nvSpPr>
-          <p:cNvPr id="26" name="Oval 25">
-            <a:extLst>
-              <a:ext uri="{FF2B5EF4-FFF2-40B4-BE49-F238E27FC236}">
-                <a16:creationId xmlns:a16="http://schemas.microsoft.com/office/drawing/2014/main" id="{8E8890C9-454A-E94A-99CC-4092CB3812E9}"/>
-              </a:ext>
-            </a:extLst>
-          </p:cNvPr>
-          <p:cNvSpPr/>
-          <p:nvPr/>
-        </p:nvSpPr>
-        <p:spPr>
-          <a:xfrm>
-            <a:off x="3886200" y="3997816"/>
-            <a:ext cx="137160" cy="137160"/>
-          </a:xfrm>
-          <a:prstGeom prst="ellipse">
-            <a:avLst/>
-          </a:prstGeom>
-        </p:spPr>
-        <p:style>
-          <a:lnRef idx="2">
-            <a:schemeClr val="accent1">
-              <a:shade val="50000"/>
-            </a:schemeClr>
-          </a:lnRef>
-          <a:fillRef idx="1">
-            <a:schemeClr val="accent1"/>
-          </a:fillRef>
-          <a:effectRef idx="0">
-            <a:schemeClr val="accent1"/>
-          </a:effectRef>
-          <a:fontRef idx="minor">
-            <a:schemeClr val="lt1"/>
-          </a:fontRef>
-        </p:style>
-        <p:txBody>
-          <a:bodyPr rtlCol="0" anchor="ctr"/>
-          <a:lstStyle/>
-          <a:p>
-            <a:pPr algn="ctr"/>
-            <a:endParaRPr lang="en-US"/>
-          </a:p>
-        </p:txBody>
-      </p:sp>
-      <p:sp>
-        <p:nvSpPr>
-          <p:cNvPr id="27" name="Oval 26">
-            <a:extLst>
-              <a:ext uri="{FF2B5EF4-FFF2-40B4-BE49-F238E27FC236}">
-                <a16:creationId xmlns:a16="http://schemas.microsoft.com/office/drawing/2014/main" id="{062335B0-AA6F-4F42-940C-897322BEC211}"/>
-              </a:ext>
-            </a:extLst>
-          </p:cNvPr>
-          <p:cNvSpPr/>
-          <p:nvPr/>
-        </p:nvSpPr>
-        <p:spPr>
-          <a:xfrm>
-            <a:off x="7406640" y="4775056"/>
-            <a:ext cx="137160" cy="137160"/>
-          </a:xfrm>
-          <a:prstGeom prst="ellipse">
-            <a:avLst/>
-          </a:prstGeom>
-        </p:spPr>
-        <p:style>
-          <a:lnRef idx="2">
-            <a:schemeClr val="accent1">
-              <a:shade val="50000"/>
-            </a:schemeClr>
-          </a:lnRef>
-          <a:fillRef idx="1">
-            <a:schemeClr val="accent1"/>
-          </a:fillRef>
-          <a:effectRef idx="0">
-            <a:schemeClr val="accent1"/>
-          </a:effectRef>
-          <a:fontRef idx="minor">
-            <a:schemeClr val="lt1"/>
-          </a:fontRef>
-        </p:style>
-        <p:txBody>
-          <a:bodyPr rtlCol="0" anchor="ctr"/>
-          <a:lstStyle/>
-          <a:p>
-            <a:pPr algn="ctr"/>
-            <a:endParaRPr lang="en-US"/>
-          </a:p>
-        </p:txBody>
-      </p:sp>
-      <p:sp>
-        <p:nvSpPr>
-          <p:cNvPr id="28" name="Oval 27">
-            <a:extLst>
-              <a:ext uri="{FF2B5EF4-FFF2-40B4-BE49-F238E27FC236}">
-                <a16:creationId xmlns:a16="http://schemas.microsoft.com/office/drawing/2014/main" id="{5ED6BA8C-4912-FB45-BF3E-A7416D22D52A}"/>
-              </a:ext>
-            </a:extLst>
-          </p:cNvPr>
-          <p:cNvSpPr/>
-          <p:nvPr/>
-        </p:nvSpPr>
-        <p:spPr>
-          <a:xfrm>
-            <a:off x="5670134" y="4912216"/>
-            <a:ext cx="137160" cy="137160"/>
-          </a:xfrm>
-          <a:prstGeom prst="ellipse">
-            <a:avLst/>
-          </a:prstGeom>
-        </p:spPr>
-        <p:style>
-          <a:lnRef idx="2">
-            <a:schemeClr val="accent1">
-              <a:shade val="50000"/>
-            </a:schemeClr>
-          </a:lnRef>
-          <a:fillRef idx="1">
-            <a:schemeClr val="accent1"/>
-          </a:fillRef>
-          <a:effectRef idx="0">
-            <a:schemeClr val="accent1"/>
-          </a:effectRef>
-          <a:fontRef idx="minor">
-            <a:schemeClr val="lt1"/>
-          </a:fontRef>
-        </p:style>
-        <p:txBody>
-          <a:bodyPr rtlCol="0" anchor="ctr"/>
-          <a:lstStyle/>
-          <a:p>
-            <a:pPr algn="ctr"/>
-            <a:endParaRPr lang="en-US"/>
-          </a:p>
-        </p:txBody>
-      </p:sp>
+        </p:grpSpPr>
+        <p:sp>
+          <p:nvSpPr>
+            <p:cNvPr id="15" name="Oval 14">
+              <a:extLst>
+                <a:ext uri="{FF2B5EF4-FFF2-40B4-BE49-F238E27FC236}">
+                  <a16:creationId xmlns:a16="http://schemas.microsoft.com/office/drawing/2014/main" id="{61117E86-0025-E243-96AE-1646E99DA366}"/>
+                </a:ext>
+              </a:extLst>
+            </p:cNvPr>
+            <p:cNvSpPr/>
+            <p:nvPr/>
+          </p:nvSpPr>
+          <p:spPr>
+            <a:xfrm>
+              <a:off x="7086600" y="3150951"/>
+              <a:ext cx="137160" cy="137160"/>
+            </a:xfrm>
+            <a:prstGeom prst="ellipse">
+              <a:avLst/>
+            </a:prstGeom>
+          </p:spPr>
+          <p:style>
+            <a:lnRef idx="2">
+              <a:schemeClr val="accent1">
+                <a:shade val="50000"/>
+              </a:schemeClr>
+            </a:lnRef>
+            <a:fillRef idx="1">
+              <a:schemeClr val="accent1"/>
+            </a:fillRef>
+            <a:effectRef idx="0">
+              <a:schemeClr val="accent1"/>
+            </a:effectRef>
+            <a:fontRef idx="minor">
+              <a:schemeClr val="lt1"/>
+            </a:fontRef>
+          </p:style>
+          <p:txBody>
+            <a:bodyPr rtlCol="0" anchor="ctr"/>
+            <a:lstStyle/>
+            <a:p>
+              <a:pPr algn="ctr"/>
+              <a:endParaRPr lang="en-US"/>
+            </a:p>
+          </p:txBody>
+        </p:sp>
+        <p:sp>
+          <p:nvSpPr>
+            <p:cNvPr id="23" name="Oval 22">
+              <a:extLst>
+                <a:ext uri="{FF2B5EF4-FFF2-40B4-BE49-F238E27FC236}">
+                  <a16:creationId xmlns:a16="http://schemas.microsoft.com/office/drawing/2014/main" id="{A0486EC9-4E24-A948-9917-7B8646A90893}"/>
+                </a:ext>
+              </a:extLst>
+            </p:cNvPr>
+            <p:cNvSpPr/>
+            <p:nvPr/>
+          </p:nvSpPr>
+          <p:spPr>
+            <a:xfrm>
+              <a:off x="6187440" y="3140422"/>
+              <a:ext cx="137160" cy="137160"/>
+            </a:xfrm>
+            <a:prstGeom prst="ellipse">
+              <a:avLst/>
+            </a:prstGeom>
+          </p:spPr>
+          <p:style>
+            <a:lnRef idx="2">
+              <a:schemeClr val="accent1">
+                <a:shade val="50000"/>
+              </a:schemeClr>
+            </a:lnRef>
+            <a:fillRef idx="1">
+              <a:schemeClr val="accent1"/>
+            </a:fillRef>
+            <a:effectRef idx="0">
+              <a:schemeClr val="accent1"/>
+            </a:effectRef>
+            <a:fontRef idx="minor">
+              <a:schemeClr val="lt1"/>
+            </a:fontRef>
+          </p:style>
+          <p:txBody>
+            <a:bodyPr rtlCol="0" anchor="ctr"/>
+            <a:lstStyle/>
+            <a:p>
+              <a:pPr algn="ctr"/>
+              <a:endParaRPr lang="en-US"/>
+            </a:p>
+          </p:txBody>
+        </p:sp>
+        <p:sp>
+          <p:nvSpPr>
+            <p:cNvPr id="24" name="Oval 23">
+              <a:extLst>
+                <a:ext uri="{FF2B5EF4-FFF2-40B4-BE49-F238E27FC236}">
+                  <a16:creationId xmlns:a16="http://schemas.microsoft.com/office/drawing/2014/main" id="{78A990E1-11DB-924D-A709-2E93371B107B}"/>
+                </a:ext>
+              </a:extLst>
+            </p:cNvPr>
+            <p:cNvSpPr/>
+            <p:nvPr/>
+          </p:nvSpPr>
+          <p:spPr>
+            <a:xfrm>
+              <a:off x="4722280" y="2565970"/>
+              <a:ext cx="137160" cy="137160"/>
+            </a:xfrm>
+            <a:prstGeom prst="ellipse">
+              <a:avLst/>
+            </a:prstGeom>
+          </p:spPr>
+          <p:style>
+            <a:lnRef idx="2">
+              <a:schemeClr val="accent1">
+                <a:shade val="50000"/>
+              </a:schemeClr>
+            </a:lnRef>
+            <a:fillRef idx="1">
+              <a:schemeClr val="accent1"/>
+            </a:fillRef>
+            <a:effectRef idx="0">
+              <a:schemeClr val="accent1"/>
+            </a:effectRef>
+            <a:fontRef idx="minor">
+              <a:schemeClr val="lt1"/>
+            </a:fontRef>
+          </p:style>
+          <p:txBody>
+            <a:bodyPr rtlCol="0" anchor="ctr"/>
+            <a:lstStyle/>
+            <a:p>
+              <a:pPr algn="ctr"/>
+              <a:endParaRPr lang="en-US"/>
+            </a:p>
+          </p:txBody>
+        </p:sp>
+        <p:sp>
+          <p:nvSpPr>
+            <p:cNvPr id="25" name="Oval 24">
+              <a:extLst>
+                <a:ext uri="{FF2B5EF4-FFF2-40B4-BE49-F238E27FC236}">
+                  <a16:creationId xmlns:a16="http://schemas.microsoft.com/office/drawing/2014/main" id="{401AC27D-A72F-0143-9280-FF6592DE5640}"/>
+                </a:ext>
+              </a:extLst>
+            </p:cNvPr>
+            <p:cNvSpPr/>
+            <p:nvPr/>
+          </p:nvSpPr>
+          <p:spPr>
+            <a:xfrm>
+              <a:off x="5229028" y="4003301"/>
+              <a:ext cx="137160" cy="137160"/>
+            </a:xfrm>
+            <a:prstGeom prst="ellipse">
+              <a:avLst/>
+            </a:prstGeom>
+          </p:spPr>
+          <p:style>
+            <a:lnRef idx="2">
+              <a:schemeClr val="accent1">
+                <a:shade val="50000"/>
+              </a:schemeClr>
+            </a:lnRef>
+            <a:fillRef idx="1">
+              <a:schemeClr val="accent1"/>
+            </a:fillRef>
+            <a:effectRef idx="0">
+              <a:schemeClr val="accent1"/>
+            </a:effectRef>
+            <a:fontRef idx="minor">
+              <a:schemeClr val="lt1"/>
+            </a:fontRef>
+          </p:style>
+          <p:txBody>
+            <a:bodyPr rtlCol="0" anchor="ctr"/>
+            <a:lstStyle/>
+            <a:p>
+              <a:pPr algn="ctr"/>
+              <a:endParaRPr lang="en-US"/>
+            </a:p>
+          </p:txBody>
+        </p:sp>
+        <p:sp>
+          <p:nvSpPr>
+            <p:cNvPr id="26" name="Oval 25">
+              <a:extLst>
+                <a:ext uri="{FF2B5EF4-FFF2-40B4-BE49-F238E27FC236}">
+                  <a16:creationId xmlns:a16="http://schemas.microsoft.com/office/drawing/2014/main" id="{8E8890C9-454A-E94A-99CC-4092CB3812E9}"/>
+                </a:ext>
+              </a:extLst>
+            </p:cNvPr>
+            <p:cNvSpPr/>
+            <p:nvPr/>
+          </p:nvSpPr>
+          <p:spPr>
+            <a:xfrm>
+              <a:off x="3886200" y="3997816"/>
+              <a:ext cx="137160" cy="137160"/>
+            </a:xfrm>
+            <a:prstGeom prst="ellipse">
+              <a:avLst/>
+            </a:prstGeom>
+          </p:spPr>
+          <p:style>
+            <a:lnRef idx="2">
+              <a:schemeClr val="accent1">
+                <a:shade val="50000"/>
+              </a:schemeClr>
+            </a:lnRef>
+            <a:fillRef idx="1">
+              <a:schemeClr val="accent1"/>
+            </a:fillRef>
+            <a:effectRef idx="0">
+              <a:schemeClr val="accent1"/>
+            </a:effectRef>
+            <a:fontRef idx="minor">
+              <a:schemeClr val="lt1"/>
+            </a:fontRef>
+          </p:style>
+          <p:txBody>
+            <a:bodyPr rtlCol="0" anchor="ctr"/>
+            <a:lstStyle/>
+            <a:p>
+              <a:pPr algn="ctr"/>
+              <a:endParaRPr lang="en-US"/>
+            </a:p>
+          </p:txBody>
+        </p:sp>
+        <p:sp>
+          <p:nvSpPr>
+            <p:cNvPr id="27" name="Oval 26">
+              <a:extLst>
+                <a:ext uri="{FF2B5EF4-FFF2-40B4-BE49-F238E27FC236}">
+                  <a16:creationId xmlns:a16="http://schemas.microsoft.com/office/drawing/2014/main" id="{062335B0-AA6F-4F42-940C-897322BEC211}"/>
+                </a:ext>
+              </a:extLst>
+            </p:cNvPr>
+            <p:cNvSpPr/>
+            <p:nvPr/>
+          </p:nvSpPr>
+          <p:spPr>
+            <a:xfrm>
+              <a:off x="7406640" y="4775056"/>
+              <a:ext cx="137160" cy="137160"/>
+            </a:xfrm>
+            <a:prstGeom prst="ellipse">
+              <a:avLst/>
+            </a:prstGeom>
+          </p:spPr>
+          <p:style>
+            <a:lnRef idx="2">
+              <a:schemeClr val="accent1">
+                <a:shade val="50000"/>
+              </a:schemeClr>
+            </a:lnRef>
+            <a:fillRef idx="1">
+              <a:schemeClr val="accent1"/>
+            </a:fillRef>
+            <a:effectRef idx="0">
+              <a:schemeClr val="accent1"/>
+            </a:effectRef>
+            <a:fontRef idx="minor">
+              <a:schemeClr val="lt1"/>
+            </a:fontRef>
+          </p:style>
+          <p:txBody>
+            <a:bodyPr rtlCol="0" anchor="ctr"/>
+            <a:lstStyle/>
+            <a:p>
+              <a:pPr algn="ctr"/>
+              <a:endParaRPr lang="en-US"/>
+            </a:p>
+          </p:txBody>
+        </p:sp>
+        <p:sp>
+          <p:nvSpPr>
+            <p:cNvPr id="28" name="Oval 27">
+              <a:extLst>
+                <a:ext uri="{FF2B5EF4-FFF2-40B4-BE49-F238E27FC236}">
+                  <a16:creationId xmlns:a16="http://schemas.microsoft.com/office/drawing/2014/main" id="{5ED6BA8C-4912-FB45-BF3E-A7416D22D52A}"/>
+                </a:ext>
+              </a:extLst>
+            </p:cNvPr>
+            <p:cNvSpPr/>
+            <p:nvPr/>
+          </p:nvSpPr>
+          <p:spPr>
+            <a:xfrm>
+              <a:off x="5670134" y="4912216"/>
+              <a:ext cx="137160" cy="137160"/>
+            </a:xfrm>
+            <a:prstGeom prst="ellipse">
+              <a:avLst/>
+            </a:prstGeom>
+          </p:spPr>
+          <p:style>
+            <a:lnRef idx="2">
+              <a:schemeClr val="accent1">
+                <a:shade val="50000"/>
+              </a:schemeClr>
+            </a:lnRef>
+            <a:fillRef idx="1">
+              <a:schemeClr val="accent1"/>
+            </a:fillRef>
+            <a:effectRef idx="0">
+              <a:schemeClr val="accent1"/>
+            </a:effectRef>
+            <a:fontRef idx="minor">
+              <a:schemeClr val="lt1"/>
+            </a:fontRef>
+          </p:style>
+          <p:txBody>
+            <a:bodyPr rtlCol="0" anchor="ctr"/>
+            <a:lstStyle/>
+            <a:p>
+              <a:pPr algn="ctr"/>
+              <a:endParaRPr lang="en-US"/>
+            </a:p>
+          </p:txBody>
+        </p:sp>
+      </p:grpSp>
     </p:spTree>
     <p:extLst>
       <p:ext uri="{BB962C8B-B14F-4D97-AF65-F5344CB8AC3E}">

</xml_diff>